<commit_message>
Fixed the ppt IP address based on the demo request.
</commit_message>
<xml_diff>
--- a/videoSrc/videoDiagram.pptx
+++ b/videoSrc/videoDiagram.pptx
@@ -229,7 +229,7 @@
           <a:p>
             <a:fld id="{DA29B1D1-0F16-46E5-9DC2-1B3330132891}" type="datetimeFigureOut">
               <a:rPr lang="en-SG" smtClean="0"/>
-              <a:t>14/6/2021</a:t>
+              <a:t>16/6/2021</a:t>
             </a:fld>
             <a:endParaRPr lang="en-SG"/>
           </a:p>
@@ -730,7 +730,7 @@
           <a:p>
             <a:fld id="{BA645228-5478-4BEB-89AA-4F24018458AD}" type="datetimeFigureOut">
               <a:rPr lang="en-SG" smtClean="0"/>
-              <a:t>14/6/2021</a:t>
+              <a:t>16/6/2021</a:t>
             </a:fld>
             <a:endParaRPr lang="en-SG"/>
           </a:p>
@@ -930,7 +930,7 @@
           <a:p>
             <a:fld id="{BA645228-5478-4BEB-89AA-4F24018458AD}" type="datetimeFigureOut">
               <a:rPr lang="en-SG" smtClean="0"/>
-              <a:t>14/6/2021</a:t>
+              <a:t>16/6/2021</a:t>
             </a:fld>
             <a:endParaRPr lang="en-SG"/>
           </a:p>
@@ -1140,7 +1140,7 @@
           <a:p>
             <a:fld id="{BA645228-5478-4BEB-89AA-4F24018458AD}" type="datetimeFigureOut">
               <a:rPr lang="en-SG" smtClean="0"/>
-              <a:t>14/6/2021</a:t>
+              <a:t>16/6/2021</a:t>
             </a:fld>
             <a:endParaRPr lang="en-SG"/>
           </a:p>
@@ -1340,7 +1340,7 @@
           <a:p>
             <a:fld id="{BA645228-5478-4BEB-89AA-4F24018458AD}" type="datetimeFigureOut">
               <a:rPr lang="en-SG" smtClean="0"/>
-              <a:t>14/6/2021</a:t>
+              <a:t>16/6/2021</a:t>
             </a:fld>
             <a:endParaRPr lang="en-SG"/>
           </a:p>
@@ -1616,7 +1616,7 @@
           <a:p>
             <a:fld id="{BA645228-5478-4BEB-89AA-4F24018458AD}" type="datetimeFigureOut">
               <a:rPr lang="en-SG" smtClean="0"/>
-              <a:t>14/6/2021</a:t>
+              <a:t>16/6/2021</a:t>
             </a:fld>
             <a:endParaRPr lang="en-SG"/>
           </a:p>
@@ -1884,7 +1884,7 @@
           <a:p>
             <a:fld id="{BA645228-5478-4BEB-89AA-4F24018458AD}" type="datetimeFigureOut">
               <a:rPr lang="en-SG" smtClean="0"/>
-              <a:t>14/6/2021</a:t>
+              <a:t>16/6/2021</a:t>
             </a:fld>
             <a:endParaRPr lang="en-SG"/>
           </a:p>
@@ -2299,7 +2299,7 @@
           <a:p>
             <a:fld id="{BA645228-5478-4BEB-89AA-4F24018458AD}" type="datetimeFigureOut">
               <a:rPr lang="en-SG" smtClean="0"/>
-              <a:t>14/6/2021</a:t>
+              <a:t>16/6/2021</a:t>
             </a:fld>
             <a:endParaRPr lang="en-SG"/>
           </a:p>
@@ -2441,7 +2441,7 @@
           <a:p>
             <a:fld id="{BA645228-5478-4BEB-89AA-4F24018458AD}" type="datetimeFigureOut">
               <a:rPr lang="en-SG" smtClean="0"/>
-              <a:t>14/6/2021</a:t>
+              <a:t>16/6/2021</a:t>
             </a:fld>
             <a:endParaRPr lang="en-SG"/>
           </a:p>
@@ -2554,7 +2554,7 @@
           <a:p>
             <a:fld id="{BA645228-5478-4BEB-89AA-4F24018458AD}" type="datetimeFigureOut">
               <a:rPr lang="en-SG" smtClean="0"/>
-              <a:t>14/6/2021</a:t>
+              <a:t>16/6/2021</a:t>
             </a:fld>
             <a:endParaRPr lang="en-SG"/>
           </a:p>
@@ -2867,7 +2867,7 @@
           <a:p>
             <a:fld id="{BA645228-5478-4BEB-89AA-4F24018458AD}" type="datetimeFigureOut">
               <a:rPr lang="en-SG" smtClean="0"/>
-              <a:t>14/6/2021</a:t>
+              <a:t>16/6/2021</a:t>
             </a:fld>
             <a:endParaRPr lang="en-SG"/>
           </a:p>
@@ -3156,7 +3156,7 @@
           <a:p>
             <a:fld id="{BA645228-5478-4BEB-89AA-4F24018458AD}" type="datetimeFigureOut">
               <a:rPr lang="en-SG" smtClean="0"/>
-              <a:t>14/6/2021</a:t>
+              <a:t>16/6/2021</a:t>
             </a:fld>
             <a:endParaRPr lang="en-SG"/>
           </a:p>
@@ -3399,7 +3399,7 @@
           <a:p>
             <a:fld id="{BA645228-5478-4BEB-89AA-4F24018458AD}" type="datetimeFigureOut">
               <a:rPr lang="en-SG" smtClean="0"/>
-              <a:t>14/6/2021</a:t>
+              <a:t>16/6/2021</a:t>
             </a:fld>
             <a:endParaRPr lang="en-SG"/>
           </a:p>
@@ -4798,7 +4798,7 @@
             </a:r>
             <a:r>
               <a:rPr lang="en-SG" sz="1100" b="1" dirty="0"/>
-              <a:t>: 172.31.103.202</a:t>
+              <a:t>: 192.168.109.x</a:t>
             </a:r>
           </a:p>
           <a:p>
@@ -4849,7 +4849,7 @@
             </a:r>
             <a:r>
               <a:rPr lang="en-SG" sz="1100" b="1" dirty="0"/>
-              <a:t>: 172.31.103.201</a:t>
+              <a:t>: 192.168.109.y</a:t>
             </a:r>
           </a:p>
           <a:p>
@@ -7154,7 +7154,7 @@
             </a:r>
             <a:r>
               <a:rPr lang="en-SG" sz="1100" b="1" dirty="0"/>
-              <a:t>: 172.31.103.202</a:t>
+              <a:t>: 192.168.109.x</a:t>
             </a:r>
           </a:p>
           <a:p>
@@ -7205,7 +7205,7 @@
             </a:r>
             <a:r>
               <a:rPr lang="en-SG" sz="1100" b="1" dirty="0"/>
-              <a:t>: 172.31.103.201</a:t>
+              <a:t>: 192.168.109.y</a:t>
             </a:r>
           </a:p>
           <a:p>
@@ -7937,42 +7937,6 @@
                             </p:childTnLst>
                           </p:cTn>
                         </p:par>
-                        <p:par>
-                          <p:cTn id="32" fill="hold">
-                            <p:stCondLst>
-                              <p:cond delay="9100"/>
-                            </p:stCondLst>
-                            <p:childTnLst>
-                              <p:par>
-                                <p:cTn id="33" presetID="1" presetClass="entr" presetSubtype="0" fill="hold" grpId="0" nodeType="afterEffect">
-                                  <p:stCondLst>
-                                    <p:cond delay="0"/>
-                                  </p:stCondLst>
-                                  <p:childTnLst>
-                                    <p:set>
-                                      <p:cBhvr>
-                                        <p:cTn id="34" dur="1" fill="hold">
-                                          <p:stCondLst>
-                                            <p:cond delay="0"/>
-                                          </p:stCondLst>
-                                        </p:cTn>
-                                        <p:tgtEl>
-                                          <p:spTgt spid="37"/>
-                                        </p:tgtEl>
-                                        <p:attrNameLst>
-                                          <p:attrName>style.visibility</p:attrName>
-                                        </p:attrNameLst>
-                                      </p:cBhvr>
-                                      <p:to>
-                                        <p:strVal val="visible"/>
-                                      </p:to>
-                                    </p:set>
-                                  </p:childTnLst>
-                                </p:cTn>
-                              </p:par>
-                            </p:childTnLst>
-                          </p:cTn>
-                        </p:par>
                       </p:childTnLst>
                     </p:cTn>
                   </p:par>
@@ -7998,7 +7962,6 @@
       </p:par>
     </p:tnLst>
     <p:bldLst>
-      <p:bldP spid="37" grpId="0"/>
       <p:bldP spid="43" grpId="0" animBg="1"/>
       <p:bldP spid="45" grpId="0" animBg="1"/>
       <p:bldP spid="49" grpId="0" animBg="1"/>

</xml_diff>